<commit_message>
Fixed spelling errors in ppt
</commit_message>
<xml_diff>
--- a/414_Etherium_ppt(2).pptx
+++ b/414_Etherium_ppt(2).pptx
@@ -363,7 +363,7 @@
           <a:p>
             <a:fld id="{365550E0-41D7-2B42-AE06-A8D527DB1C96}" type="datetimeFigureOut">
               <a:rPr lang="en-US" smtClean="0"/>
-              <a:t>11/4/14</a:t>
+              <a:t>11/4/2014</a:t>
             </a:fld>
             <a:endParaRPr lang="en-US"/>
           </a:p>
@@ -577,7 +577,7 @@
           <a:p>
             <a:fld id="{365550E0-41D7-2B42-AE06-A8D527DB1C96}" type="datetimeFigureOut">
               <a:rPr lang="en-US" smtClean="0"/>
-              <a:t>11/4/14</a:t>
+              <a:t>11/4/2014</a:t>
             </a:fld>
             <a:endParaRPr lang="en-US"/>
           </a:p>
@@ -844,7 +844,7 @@
           <a:p>
             <a:fld id="{365550E0-41D7-2B42-AE06-A8D527DB1C96}" type="datetimeFigureOut">
               <a:rPr lang="en-US" smtClean="0"/>
-              <a:t>11/4/14</a:t>
+              <a:t>11/4/2014</a:t>
             </a:fld>
             <a:endParaRPr lang="en-US"/>
           </a:p>
@@ -994,7 +994,7 @@
           <a:p>
             <a:fld id="{365550E0-41D7-2B42-AE06-A8D527DB1C96}" type="datetimeFigureOut">
               <a:rPr lang="en-US" smtClean="0"/>
-              <a:t>11/4/14</a:t>
+              <a:t>11/4/2014</a:t>
             </a:fld>
             <a:endParaRPr lang="en-US"/>
           </a:p>
@@ -1324,7 +1324,7 @@
           <a:p>
             <a:fld id="{365550E0-41D7-2B42-AE06-A8D527DB1C96}" type="datetimeFigureOut">
               <a:rPr lang="en-US" smtClean="0"/>
-              <a:t>11/4/14</a:t>
+              <a:t>11/4/2014</a:t>
             </a:fld>
             <a:endParaRPr lang="en-US"/>
           </a:p>
@@ -1632,7 +1632,7 @@
           <a:p>
             <a:fld id="{365550E0-41D7-2B42-AE06-A8D527DB1C96}" type="datetimeFigureOut">
               <a:rPr lang="en-US" smtClean="0"/>
-              <a:t>11/4/14</a:t>
+              <a:t>11/4/2014</a:t>
             </a:fld>
             <a:endParaRPr lang="en-US"/>
           </a:p>
@@ -2053,7 +2053,7 @@
           <a:p>
             <a:fld id="{365550E0-41D7-2B42-AE06-A8D527DB1C96}" type="datetimeFigureOut">
               <a:rPr lang="en-US" smtClean="0"/>
-              <a:t>11/4/14</a:t>
+              <a:t>11/4/2014</a:t>
             </a:fld>
             <a:endParaRPr lang="en-US"/>
           </a:p>
@@ -2166,7 +2166,7 @@
           <a:p>
             <a:fld id="{365550E0-41D7-2B42-AE06-A8D527DB1C96}" type="datetimeFigureOut">
               <a:rPr lang="en-US" smtClean="0"/>
-              <a:t>11/4/14</a:t>
+              <a:t>11/4/2014</a:t>
             </a:fld>
             <a:endParaRPr lang="en-US"/>
           </a:p>
@@ -2325,7 +2325,7 @@
           <a:p>
             <a:fld id="{365550E0-41D7-2B42-AE06-A8D527DB1C96}" type="datetimeFigureOut">
               <a:rPr lang="en-US" smtClean="0"/>
-              <a:t>11/4/14</a:t>
+              <a:t>11/4/2014</a:t>
             </a:fld>
             <a:endParaRPr lang="en-US"/>
           </a:p>
@@ -2709,7 +2709,7 @@
           <a:p>
             <a:fld id="{365550E0-41D7-2B42-AE06-A8D527DB1C96}" type="datetimeFigureOut">
               <a:rPr lang="en-US" smtClean="0"/>
-              <a:t>11/4/14</a:t>
+              <a:t>11/4/2014</a:t>
             </a:fld>
             <a:endParaRPr lang="en-US"/>
           </a:p>
@@ -3071,7 +3071,7 @@
           <a:p>
             <a:fld id="{365550E0-41D7-2B42-AE06-A8D527DB1C96}" type="datetimeFigureOut">
               <a:rPr lang="en-US" smtClean="0"/>
-              <a:t>11/4/14</a:t>
+              <a:t>11/4/2014</a:t>
             </a:fld>
             <a:endParaRPr lang="en-US"/>
           </a:p>
@@ -3405,7 +3405,7 @@
           <a:p>
             <a:fld id="{365550E0-41D7-2B42-AE06-A8D527DB1C96}" type="datetimeFigureOut">
               <a:rPr lang="en-US" smtClean="0"/>
-              <a:t>11/4/14</a:t>
+              <a:t>11/4/2014</a:t>
             </a:fld>
             <a:endParaRPr lang="en-US"/>
           </a:p>
@@ -3973,8 +3973,8 @@
               <a:t>What is an </a:t>
             </a:r>
             <a:r>
-              <a:rPr lang="en-US" b="1" cap="small" normalizeH="1" dirty="0" err="1" smtClean="0"/>
-              <a:t>Eskrow</a:t>
+              <a:rPr lang="en-US" b="1" cap="small" normalizeH="1" dirty="0" smtClean="0"/>
+              <a:t>Escrow</a:t>
             </a:r>
             <a:endParaRPr lang="en-US" b="1" cap="small" normalizeH="1" dirty="0"/>
           </a:p>
@@ -4062,26 +4062,30 @@
               <a:t>Using the </a:t>
             </a:r>
             <a:r>
-              <a:rPr lang="en-US" sz="2800" dirty="0" err="1" smtClean="0"/>
-              <a:t>eskrow</a:t>
-            </a:r>
-            <a:r>
               <a:rPr lang="en-US" sz="2800" dirty="0" smtClean="0"/>
-              <a:t> as a middle man, sender can set up contract for a recipient to complete</a:t>
-            </a:r>
-          </a:p>
-          <a:p>
+              <a:t>escrow </a:t>
+            </a:r>
             <a:r>
               <a:rPr lang="en-US" sz="2800" dirty="0" smtClean="0"/>
-              <a:t>Upon completion recipient gets money, the </a:t>
-            </a:r>
-            <a:r>
-              <a:rPr lang="en-US" sz="2800" dirty="0" err="1" smtClean="0"/>
-              <a:t>eskrow</a:t>
-            </a:r>
+              <a:t>as a middle man, sender can set up contract for a recipient to complete</a:t>
+            </a:r>
+          </a:p>
+          <a:p>
             <a:r>
               <a:rPr lang="en-US" sz="2800" dirty="0" smtClean="0"/>
-              <a:t> keeps 5%</a:t>
+              <a:t>Upon completion recipient gets money, </a:t>
+            </a:r>
+            <a:r>
+              <a:rPr lang="en-US" sz="2800" smtClean="0"/>
+              <a:t>the </a:t>
+            </a:r>
+            <a:r>
+              <a:rPr lang="en-US" sz="2800" smtClean="0"/>
+              <a:t>escrow </a:t>
+            </a:r>
+            <a:r>
+              <a:rPr lang="en-US" sz="2800" dirty="0" smtClean="0"/>
+              <a:t>keeps 5%</a:t>
             </a:r>
           </a:p>
           <a:p>

</xml_diff>